<commit_message>
ppt not modify much
</commit_message>
<xml_diff>
--- a/Personal/Ye/图书馆自习室预定系统ver2.pptx
+++ b/Personal/Ye/图书馆自习室预定系统ver2.pptx
@@ -1,22 +1,22 @@
 
 <file path=ppt/presentation.xml><?xml version="1.0" encoding="utf-8"?>
-<p:presentation xmlns:a="http://schemas.openxmlformats.org/drawingml/2006/main" xmlns:r="http://schemas.openxmlformats.org/officeDocument/2006/relationships" xmlns:p="http://schemas.openxmlformats.org/presentationml/2006/main">
+<p:presentation xmlns:a="http://schemas.openxmlformats.org/drawingml/2006/main" xmlns:r="http://schemas.openxmlformats.org/officeDocument/2006/relationships" xmlns:p="http://schemas.openxmlformats.org/presentationml/2006/main" saveSubsetFonts="1">
   <p:sldMasterIdLst>
     <p:sldMasterId id="2147483648" r:id="rId1"/>
   </p:sldMasterIdLst>
   <p:notesMasterIdLst>
-    <p:notesMasterId r:id="rId4"/>
+    <p:notesMasterId r:id="rId8"/>
   </p:notesMasterIdLst>
   <p:sldIdLst>
-    <p:sldId id="256" r:id="rId3"/>
-    <p:sldId id="276" r:id="rId5"/>
-    <p:sldId id="273" r:id="rId6"/>
-    <p:sldId id="274" r:id="rId7"/>
-    <p:sldId id="280" r:id="rId8"/>
-    <p:sldId id="260" r:id="rId9"/>
+    <p:sldId id="256" r:id="rId2"/>
+    <p:sldId id="276" r:id="rId3"/>
+    <p:sldId id="273" r:id="rId4"/>
+    <p:sldId id="274" r:id="rId5"/>
+    <p:sldId id="280" r:id="rId6"/>
+    <p:sldId id="260" r:id="rId7"/>
   </p:sldIdLst>
   <p:sldSz cx="12192000" cy="6858000"/>
-  <p:notesSz cx="7103745" cy="10234295"/>
+  <p:notesSz cx="7104063" cy="10234613"/>
   <p:defaultTextStyle>
     <a:defPPr>
       <a:defRPr lang="zh-CN"/>
@@ -112,6 +112,11 @@
       </a:defRPr>
     </a:lvl9pPr>
   </p:defaultTextStyle>
+  <p:extLst>
+    <p:ext uri="{EFAFB233-063F-42B5-8137-9DF3F51BA10A}">
+      <p15:sldGuideLst xmlns:p15="http://schemas.microsoft.com/office/powerpoint/2012/main"/>
+    </p:ext>
+  </p:extLst>
 </p:presentation>
 </file>
 
@@ -197,6 +202,7 @@
           <a:p>
             <a:fld id="{D2A48B96-639E-45A3-A0BA-2464DFDB1FAA}" type="datetimeFigureOut">
               <a:rPr lang="zh-CN" altLang="en-US" smtClean="0"/>
+              <a:t>2017/6/2</a:t>
             </a:fld>
             <a:endParaRPr lang="zh-CN" altLang="en-US"/>
           </a:p>
@@ -263,7 +269,6 @@
               <a:rPr lang="zh-CN" altLang="en-US"/>
               <a:t>单击此处编辑母版文本样式</a:t>
             </a:r>
-            <a:endParaRPr lang="zh-CN" altLang="en-US"/>
           </a:p>
           <a:p>
             <a:pPr lvl="1"/>
@@ -271,7 +276,6 @@
               <a:rPr lang="zh-CN" altLang="en-US"/>
               <a:t>第二级</a:t>
             </a:r>
-            <a:endParaRPr lang="zh-CN" altLang="en-US"/>
           </a:p>
           <a:p>
             <a:pPr lvl="2"/>
@@ -279,7 +283,6 @@
               <a:rPr lang="zh-CN" altLang="en-US"/>
               <a:t>第三级</a:t>
             </a:r>
-            <a:endParaRPr lang="zh-CN" altLang="en-US"/>
           </a:p>
           <a:p>
             <a:pPr lvl="3"/>
@@ -287,7 +290,6 @@
               <a:rPr lang="zh-CN" altLang="en-US"/>
               <a:t>第四级</a:t>
             </a:r>
-            <a:endParaRPr lang="zh-CN" altLang="en-US"/>
           </a:p>
           <a:p>
             <a:pPr lvl="4"/>
@@ -295,7 +297,6 @@
               <a:rPr lang="zh-CN" altLang="en-US"/>
               <a:t>第五级</a:t>
             </a:r>
-            <a:endParaRPr lang="zh-CN" altLang="en-US"/>
           </a:p>
         </p:txBody>
       </p:sp>
@@ -359,6 +360,7 @@
           <a:p>
             <a:fld id="{A6837353-30EB-4A48-80EB-173D804AEFBD}" type="slidenum">
               <a:rPr lang="zh-CN" altLang="en-US" smtClean="0"/>
+              <a:t>‹#›</a:t>
             </a:fld>
             <a:endParaRPr lang="zh-CN" altLang="en-US"/>
           </a:p>
@@ -532,6 +534,7 @@
           <a:p>
             <a:fld id="{38100ACD-FD38-435B-93FE-FF31ECDF372E}" type="slidenum">
               <a:rPr lang="zh-CN" altLang="en-US" smtClean="0"/>
+              <a:t>1</a:t>
             </a:fld>
             <a:endParaRPr lang="zh-CN" altLang="en-US"/>
           </a:p>
@@ -702,6 +705,7 @@
           <a:p>
             <a:fld id="{7A9F0064-1D3A-4468-A1B1-52CF93AA3DB0}" type="datetimeFigureOut">
               <a:rPr lang="zh-CN" altLang="en-US" smtClean="0"/>
+              <a:t>2017/6/2</a:t>
             </a:fld>
             <a:endParaRPr lang="zh-CN" altLang="en-US"/>
           </a:p>
@@ -743,6 +747,7 @@
           <a:p>
             <a:fld id="{EF429EE8-1FE3-4EDB-A8CA-BA68A812CEF7}" type="slidenum">
               <a:rPr lang="zh-CN" altLang="en-US" smtClean="0"/>
+              <a:t>‹#›</a:t>
             </a:fld>
             <a:endParaRPr lang="zh-CN" altLang="en-US"/>
           </a:p>
@@ -790,6 +795,7 @@
           <a:p>
             <a:fld id="{1EC61D3F-34E9-4F9D-84A2-72367D9F9A68}" type="datetimeFigureOut">
               <a:rPr lang="zh-CN" altLang="en-US" smtClean="0"/>
+              <a:t>2017/6/2</a:t>
             </a:fld>
             <a:endParaRPr lang="zh-CN" altLang="en-US"/>
           </a:p>
@@ -831,6 +837,7 @@
           <a:p>
             <a:fld id="{4254DC01-BD11-43BE-8FE9-19C0CFD26E47}" type="slidenum">
               <a:rPr lang="zh-CN" altLang="en-US" smtClean="0"/>
+              <a:t>‹#›</a:t>
             </a:fld>
             <a:endParaRPr lang="zh-CN" altLang="en-US"/>
           </a:p>
@@ -909,7 +916,6 @@
               <a:rPr lang="zh-CN" altLang="en-US" dirty="0"/>
               <a:t>单击此处编辑母版文本样式</a:t>
             </a:r>
-            <a:endParaRPr lang="zh-CN" altLang="en-US" dirty="0"/>
           </a:p>
           <a:p>
             <a:pPr lvl="1"/>
@@ -917,7 +923,6 @@
               <a:rPr lang="zh-CN" altLang="en-US" dirty="0"/>
               <a:t>第二级</a:t>
             </a:r>
-            <a:endParaRPr lang="zh-CN" altLang="en-US" dirty="0"/>
           </a:p>
           <a:p>
             <a:pPr lvl="2"/>
@@ -925,7 +930,6 @@
               <a:rPr lang="zh-CN" altLang="en-US" dirty="0"/>
               <a:t>第三级</a:t>
             </a:r>
-            <a:endParaRPr lang="zh-CN" altLang="en-US" dirty="0"/>
           </a:p>
           <a:p>
             <a:pPr lvl="3"/>
@@ -933,7 +937,6 @@
               <a:rPr lang="zh-CN" altLang="en-US" dirty="0"/>
               <a:t>第四级</a:t>
             </a:r>
-            <a:endParaRPr lang="zh-CN" altLang="en-US" dirty="0"/>
           </a:p>
           <a:p>
             <a:pPr lvl="4"/>
@@ -941,7 +944,6 @@
               <a:rPr lang="zh-CN" altLang="en-US" dirty="0"/>
               <a:t>第五级</a:t>
             </a:r>
-            <a:endParaRPr lang="zh-CN" altLang="en-US" dirty="0"/>
           </a:p>
         </p:txBody>
       </p:sp>
@@ -1059,7 +1061,6 @@
               <a:rPr lang="zh-CN" altLang="en-US"/>
               <a:t>单击此处编辑母版文本样式</a:t>
             </a:r>
-            <a:endParaRPr lang="zh-CN" altLang="en-US"/>
           </a:p>
           <a:p>
             <a:pPr lvl="1"/>
@@ -1067,7 +1068,6 @@
               <a:rPr lang="zh-CN" altLang="en-US"/>
               <a:t>第二级</a:t>
             </a:r>
-            <a:endParaRPr lang="zh-CN" altLang="en-US"/>
           </a:p>
           <a:p>
             <a:pPr lvl="2"/>
@@ -1075,7 +1075,6 @@
               <a:rPr lang="zh-CN" altLang="en-US"/>
               <a:t>第三级</a:t>
             </a:r>
-            <a:endParaRPr lang="zh-CN" altLang="en-US"/>
           </a:p>
           <a:p>
             <a:pPr lvl="3"/>
@@ -1083,7 +1082,6 @@
               <a:rPr lang="zh-CN" altLang="en-US"/>
               <a:t>第四级</a:t>
             </a:r>
-            <a:endParaRPr lang="zh-CN" altLang="en-US"/>
           </a:p>
           <a:p>
             <a:pPr lvl="4"/>
@@ -1112,6 +1110,7 @@
           <a:p>
             <a:fld id="{7A9F0064-1D3A-4468-A1B1-52CF93AA3DB0}" type="datetimeFigureOut">
               <a:rPr lang="zh-CN" altLang="en-US" smtClean="0"/>
+              <a:t>2017/6/2</a:t>
             </a:fld>
             <a:endParaRPr lang="zh-CN" altLang="en-US"/>
           </a:p>
@@ -1153,6 +1152,7 @@
           <a:p>
             <a:fld id="{EF429EE8-1FE3-4EDB-A8CA-BA68A812CEF7}" type="slidenum">
               <a:rPr lang="zh-CN" altLang="en-US" smtClean="0"/>
+              <a:t>‹#›</a:t>
             </a:fld>
             <a:endParaRPr lang="zh-CN" altLang="en-US"/>
           </a:p>
@@ -1333,7 +1333,6 @@
               <a:rPr lang="zh-CN" altLang="en-US"/>
               <a:t>单击此处编辑母版文本样式</a:t>
             </a:r>
-            <a:endParaRPr lang="zh-CN" altLang="en-US"/>
           </a:p>
         </p:txBody>
       </p:sp>
@@ -1354,6 +1353,7 @@
           <a:p>
             <a:fld id="{7A9F0064-1D3A-4468-A1B1-52CF93AA3DB0}" type="datetimeFigureOut">
               <a:rPr lang="zh-CN" altLang="en-US" smtClean="0"/>
+              <a:t>2017/6/2</a:t>
             </a:fld>
             <a:endParaRPr lang="zh-CN" altLang="en-US"/>
           </a:p>
@@ -1395,6 +1395,7 @@
           <a:p>
             <a:fld id="{EF429EE8-1FE3-4EDB-A8CA-BA68A812CEF7}" type="slidenum">
               <a:rPr lang="zh-CN" altLang="en-US" smtClean="0"/>
+              <a:t>‹#›</a:t>
             </a:fld>
             <a:endParaRPr lang="zh-CN" altLang="en-US"/>
           </a:p>
@@ -1408,7 +1409,7 @@
           </p:cNvCxnSpPr>
           <p:nvPr>
             <p:custDataLst>
-              <p:tags r:id="rId2"/>
+              <p:tags r:id="rId1"/>
             </p:custDataLst>
           </p:nvPr>
         </p:nvCxnSpPr>
@@ -1444,7 +1445,7 @@
           </p:cNvCxnSpPr>
           <p:nvPr>
             <p:custDataLst>
-              <p:tags r:id="rId3"/>
+              <p:tags r:id="rId2"/>
             </p:custDataLst>
           </p:nvPr>
         </p:nvCxnSpPr>
@@ -1591,7 +1592,6 @@
               <a:rPr lang="zh-CN" altLang="en-US"/>
               <a:t>单击此处编辑母版文本样式</a:t>
             </a:r>
-            <a:endParaRPr lang="zh-CN" altLang="en-US"/>
           </a:p>
           <a:p>
             <a:pPr lvl="1"/>
@@ -1599,7 +1599,6 @@
               <a:rPr lang="zh-CN" altLang="en-US"/>
               <a:t>第二级</a:t>
             </a:r>
-            <a:endParaRPr lang="zh-CN" altLang="en-US"/>
           </a:p>
           <a:p>
             <a:pPr lvl="2"/>
@@ -1607,7 +1606,6 @@
               <a:rPr lang="zh-CN" altLang="en-US"/>
               <a:t>第三级</a:t>
             </a:r>
-            <a:endParaRPr lang="zh-CN" altLang="en-US"/>
           </a:p>
           <a:p>
             <a:pPr lvl="3"/>
@@ -1615,7 +1613,6 @@
               <a:rPr lang="zh-CN" altLang="en-US"/>
               <a:t>第四级</a:t>
             </a:r>
-            <a:endParaRPr lang="zh-CN" altLang="en-US"/>
           </a:p>
           <a:p>
             <a:pPr lvl="4"/>
@@ -1698,7 +1695,6 @@
               <a:rPr lang="zh-CN" altLang="en-US"/>
               <a:t>单击此处编辑母版文本样式</a:t>
             </a:r>
-            <a:endParaRPr lang="zh-CN" altLang="en-US"/>
           </a:p>
           <a:p>
             <a:pPr lvl="1"/>
@@ -1706,7 +1702,6 @@
               <a:rPr lang="zh-CN" altLang="en-US"/>
               <a:t>第二级</a:t>
             </a:r>
-            <a:endParaRPr lang="zh-CN" altLang="en-US"/>
           </a:p>
           <a:p>
             <a:pPr lvl="2"/>
@@ -1714,7 +1709,6 @@
               <a:rPr lang="zh-CN" altLang="en-US"/>
               <a:t>第三级</a:t>
             </a:r>
-            <a:endParaRPr lang="zh-CN" altLang="en-US"/>
           </a:p>
           <a:p>
             <a:pPr lvl="3"/>
@@ -1722,7 +1716,6 @@
               <a:rPr lang="zh-CN" altLang="en-US"/>
               <a:t>第四级</a:t>
             </a:r>
-            <a:endParaRPr lang="zh-CN" altLang="en-US"/>
           </a:p>
           <a:p>
             <a:pPr lvl="4"/>
@@ -1751,6 +1744,7 @@
           <a:p>
             <a:fld id="{7A9F0064-1D3A-4468-A1B1-52CF93AA3DB0}" type="datetimeFigureOut">
               <a:rPr lang="zh-CN" altLang="en-US" smtClean="0"/>
+              <a:t>2017/6/2</a:t>
             </a:fld>
             <a:endParaRPr lang="zh-CN" altLang="en-US"/>
           </a:p>
@@ -1792,6 +1786,7 @@
           <a:p>
             <a:fld id="{EF429EE8-1FE3-4EDB-A8CA-BA68A812CEF7}" type="slidenum">
               <a:rPr lang="zh-CN" altLang="en-US" smtClean="0"/>
+              <a:t>‹#›</a:t>
             </a:fld>
             <a:endParaRPr lang="zh-CN" altLang="en-US"/>
           </a:p>
@@ -1912,7 +1907,6 @@
               <a:rPr lang="zh-CN" altLang="en-US"/>
               <a:t>单击此处编辑母版文本样式</a:t>
             </a:r>
-            <a:endParaRPr lang="zh-CN" altLang="en-US"/>
           </a:p>
         </p:txBody>
       </p:sp>
@@ -1987,7 +1981,6 @@
               <a:rPr lang="zh-CN" altLang="en-US" dirty="0"/>
               <a:t>单击此处编辑母版文本样式</a:t>
             </a:r>
-            <a:endParaRPr lang="zh-CN" altLang="en-US" dirty="0"/>
           </a:p>
           <a:p>
             <a:pPr lvl="1"/>
@@ -1995,7 +1988,6 @@
               <a:rPr lang="zh-CN" altLang="en-US" dirty="0"/>
               <a:t>第二级</a:t>
             </a:r>
-            <a:endParaRPr lang="zh-CN" altLang="en-US" dirty="0"/>
           </a:p>
           <a:p>
             <a:pPr lvl="2"/>
@@ -2003,7 +1995,6 @@
               <a:rPr lang="zh-CN" altLang="en-US" dirty="0"/>
               <a:t>第三级</a:t>
             </a:r>
-            <a:endParaRPr lang="zh-CN" altLang="en-US" dirty="0"/>
           </a:p>
           <a:p>
             <a:pPr lvl="3"/>
@@ -2011,7 +2002,6 @@
               <a:rPr lang="zh-CN" altLang="en-US" dirty="0"/>
               <a:t>第四级</a:t>
             </a:r>
-            <a:endParaRPr lang="zh-CN" altLang="en-US" dirty="0"/>
           </a:p>
           <a:p>
             <a:pPr lvl="4"/>
@@ -2085,7 +2075,6 @@
               <a:rPr lang="zh-CN" altLang="en-US"/>
               <a:t>单击此处编辑母版文本样式</a:t>
             </a:r>
-            <a:endParaRPr lang="zh-CN" altLang="en-US"/>
           </a:p>
         </p:txBody>
       </p:sp>
@@ -2160,7 +2149,6 @@
               <a:rPr lang="zh-CN" altLang="en-US"/>
               <a:t>单击此处编辑母版文本样式</a:t>
             </a:r>
-            <a:endParaRPr lang="zh-CN" altLang="en-US"/>
           </a:p>
           <a:p>
             <a:pPr lvl="1"/>
@@ -2168,7 +2156,6 @@
               <a:rPr lang="zh-CN" altLang="en-US"/>
               <a:t>第二级</a:t>
             </a:r>
-            <a:endParaRPr lang="zh-CN" altLang="en-US"/>
           </a:p>
           <a:p>
             <a:pPr lvl="2"/>
@@ -2176,7 +2163,6 @@
               <a:rPr lang="zh-CN" altLang="en-US"/>
               <a:t>第三级</a:t>
             </a:r>
-            <a:endParaRPr lang="zh-CN" altLang="en-US"/>
           </a:p>
           <a:p>
             <a:pPr lvl="3"/>
@@ -2184,7 +2170,6 @@
               <a:rPr lang="zh-CN" altLang="en-US"/>
               <a:t>第四级</a:t>
             </a:r>
-            <a:endParaRPr lang="zh-CN" altLang="en-US"/>
           </a:p>
           <a:p>
             <a:pPr lvl="4"/>
@@ -2213,6 +2198,7 @@
           <a:p>
             <a:fld id="{7A9F0064-1D3A-4468-A1B1-52CF93AA3DB0}" type="datetimeFigureOut">
               <a:rPr lang="zh-CN" altLang="en-US" smtClean="0"/>
+              <a:t>2017/6/2</a:t>
             </a:fld>
             <a:endParaRPr lang="zh-CN" altLang="en-US"/>
           </a:p>
@@ -2254,6 +2240,7 @@
           <a:p>
             <a:fld id="{EF429EE8-1FE3-4EDB-A8CA-BA68A812CEF7}" type="slidenum">
               <a:rPr lang="zh-CN" altLang="en-US" smtClean="0"/>
+              <a:t>‹#›</a:t>
             </a:fld>
             <a:endParaRPr lang="zh-CN" altLang="en-US"/>
           </a:p>
@@ -2329,6 +2316,7 @@
           <a:p>
             <a:fld id="{7A9F0064-1D3A-4468-A1B1-52CF93AA3DB0}" type="datetimeFigureOut">
               <a:rPr lang="zh-CN" altLang="en-US" smtClean="0"/>
+              <a:t>2017/6/2</a:t>
             </a:fld>
             <a:endParaRPr lang="zh-CN" altLang="en-US"/>
           </a:p>
@@ -2370,6 +2358,7 @@
           <a:p>
             <a:fld id="{EF429EE8-1FE3-4EDB-A8CA-BA68A812CEF7}" type="slidenum">
               <a:rPr lang="zh-CN" altLang="en-US" smtClean="0"/>
+              <a:t>‹#›</a:t>
             </a:fld>
             <a:endParaRPr lang="zh-CN" altLang="en-US"/>
           </a:p>
@@ -2417,6 +2406,7 @@
           <a:p>
             <a:fld id="{7A9F0064-1D3A-4468-A1B1-52CF93AA3DB0}" type="datetimeFigureOut">
               <a:rPr lang="zh-CN" altLang="en-US" smtClean="0"/>
+              <a:t>2017/6/2</a:t>
             </a:fld>
             <a:endParaRPr lang="zh-CN" altLang="en-US"/>
           </a:p>
@@ -2458,6 +2448,7 @@
           <a:p>
             <a:fld id="{EF429EE8-1FE3-4EDB-A8CA-BA68A812CEF7}" type="slidenum">
               <a:rPr lang="zh-CN" altLang="en-US" smtClean="0"/>
+              <a:t>‹#›</a:t>
             </a:fld>
             <a:endParaRPr lang="zh-CN" altLang="en-US"/>
           </a:p>
@@ -2655,7 +2646,6 @@
               <a:rPr lang="zh-CN" altLang="en-US"/>
               <a:t>单击此处编辑母版文本样式</a:t>
             </a:r>
-            <a:endParaRPr lang="zh-CN" altLang="en-US"/>
           </a:p>
         </p:txBody>
       </p:sp>
@@ -2676,6 +2666,7 @@
           <a:p>
             <a:fld id="{7A9F0064-1D3A-4468-A1B1-52CF93AA3DB0}" type="datetimeFigureOut">
               <a:rPr lang="zh-CN" altLang="en-US" smtClean="0"/>
+              <a:t>2017/6/2</a:t>
             </a:fld>
             <a:endParaRPr lang="zh-CN" altLang="en-US"/>
           </a:p>
@@ -2717,6 +2708,7 @@
           <a:p>
             <a:fld id="{EF429EE8-1FE3-4EDB-A8CA-BA68A812CEF7}" type="slidenum">
               <a:rPr lang="zh-CN" altLang="en-US" smtClean="0"/>
+              <a:t>‹#›</a:t>
             </a:fld>
             <a:endParaRPr lang="zh-CN" altLang="en-US"/>
           </a:p>
@@ -2846,7 +2838,6 @@
               <a:rPr lang="zh-CN" altLang="en-US"/>
               <a:t>单击此处编辑母版文本样式</a:t>
             </a:r>
-            <a:endParaRPr lang="zh-CN" altLang="en-US"/>
           </a:p>
           <a:p>
             <a:pPr lvl="1"/>
@@ -2854,7 +2845,6 @@
               <a:rPr lang="zh-CN" altLang="en-US"/>
               <a:t>第二级</a:t>
             </a:r>
-            <a:endParaRPr lang="zh-CN" altLang="en-US"/>
           </a:p>
           <a:p>
             <a:pPr lvl="2"/>
@@ -2862,7 +2852,6 @@
               <a:rPr lang="zh-CN" altLang="en-US"/>
               <a:t>第三级</a:t>
             </a:r>
-            <a:endParaRPr lang="zh-CN" altLang="en-US"/>
           </a:p>
           <a:p>
             <a:pPr lvl="3"/>
@@ -2870,7 +2859,6 @@
               <a:rPr lang="zh-CN" altLang="en-US"/>
               <a:t>第四级</a:t>
             </a:r>
-            <a:endParaRPr lang="zh-CN" altLang="en-US"/>
           </a:p>
           <a:p>
             <a:pPr lvl="4"/>
@@ -2899,6 +2887,7 @@
           <a:p>
             <a:fld id="{7A9F0064-1D3A-4468-A1B1-52CF93AA3DB0}" type="datetimeFigureOut">
               <a:rPr lang="zh-CN" altLang="en-US" smtClean="0"/>
+              <a:t>2017/6/2</a:t>
             </a:fld>
             <a:endParaRPr lang="zh-CN" altLang="en-US"/>
           </a:p>
@@ -2940,6 +2929,7 @@
           <a:p>
             <a:fld id="{EF429EE8-1FE3-4EDB-A8CA-BA68A812CEF7}" type="slidenum">
               <a:rPr lang="zh-CN" altLang="en-US" smtClean="0"/>
+              <a:t>‹#›</a:t>
             </a:fld>
             <a:endParaRPr lang="zh-CN" altLang="en-US"/>
           </a:p>
@@ -2959,7 +2949,7 @@
     <p:bg>
       <p:bgPr>
         <a:blipFill dpi="0" rotWithShape="1">
-          <a:blip r:embed="rId11">
+          <a:blip r:embed="rId14">
             <a:lum/>
           </a:blip>
           <a:srcRect/>
@@ -3053,7 +3043,6 @@
               <a:rPr lang="zh-CN" altLang="en-US" dirty="0"/>
               <a:t>单击此处编辑母版文本样式</a:t>
             </a:r>
-            <a:endParaRPr lang="zh-CN" altLang="en-US" dirty="0"/>
           </a:p>
           <a:p>
             <a:pPr lvl="1"/>
@@ -3061,7 +3050,6 @@
               <a:rPr lang="zh-CN" altLang="en-US" dirty="0"/>
               <a:t>第二级</a:t>
             </a:r>
-            <a:endParaRPr lang="zh-CN" altLang="en-US" dirty="0"/>
           </a:p>
           <a:p>
             <a:pPr lvl="2"/>
@@ -3069,7 +3057,6 @@
               <a:rPr lang="zh-CN" altLang="en-US" dirty="0"/>
               <a:t>第三级</a:t>
             </a:r>
-            <a:endParaRPr lang="zh-CN" altLang="en-US" dirty="0"/>
           </a:p>
           <a:p>
             <a:pPr lvl="3"/>
@@ -3077,7 +3064,6 @@
               <a:rPr lang="zh-CN" altLang="en-US" dirty="0"/>
               <a:t>第四级</a:t>
             </a:r>
-            <a:endParaRPr lang="zh-CN" altLang="en-US" dirty="0"/>
           </a:p>
           <a:p>
             <a:pPr lvl="4"/>
@@ -3124,6 +3110,7 @@
           <a:p>
             <a:fld id="{7A9F0064-1D3A-4468-A1B1-52CF93AA3DB0}" type="datetimeFigureOut">
               <a:rPr lang="zh-CN" altLang="en-US" smtClean="0"/>
+              <a:t>2017/6/2</a:t>
             </a:fld>
             <a:endParaRPr lang="zh-CN" altLang="en-US"/>
           </a:p>
@@ -3201,6 +3188,7 @@
           <a:p>
             <a:fld id="{EF429EE8-1FE3-4EDB-A8CA-BA68A812CEF7}" type="slidenum">
               <a:rPr lang="zh-CN" altLang="en-US" smtClean="0"/>
+              <a:t>‹#›</a:t>
             </a:fld>
             <a:endParaRPr lang="zh-CN" altLang="en-US"/>
           </a:p>
@@ -3530,7 +3518,7 @@
           <p:nvPr>
             <p:ph type="ctrTitle"/>
             <p:custDataLst>
-              <p:tags r:id="rId1"/>
+              <p:tags r:id="rId2"/>
             </p:custDataLst>
           </p:nvPr>
         </p:nvSpPr>
@@ -3548,7 +3536,6 @@
               <a:rPr lang="zh-CN" altLang="en-US" dirty="0"/>
               <a:t>图书馆自习室预定系统</a:t>
             </a:r>
-            <a:endParaRPr lang="zh-CN" altLang="en-US" dirty="0"/>
           </a:p>
         </p:txBody>
       </p:sp>
@@ -3561,7 +3548,7 @@
           <p:nvPr>
             <p:ph type="subTitle" idx="1"/>
             <p:custDataLst>
-              <p:tags r:id="rId2"/>
+              <p:tags r:id="rId3"/>
             </p:custDataLst>
           </p:nvPr>
         </p:nvSpPr>
@@ -3585,35 +3572,30 @@
               <a:rPr lang="en-US" altLang="zh-CN" dirty="0"/>
               <a:t>515030910062</a:t>
             </a:r>
-            <a:endParaRPr lang="en-US" altLang="zh-CN" dirty="0"/>
           </a:p>
           <a:p>
             <a:r>
               <a:rPr lang="zh-CN" altLang="en-US" dirty="0"/>
               <a:t>           刘君益    515030910436</a:t>
             </a:r>
-            <a:endParaRPr lang="zh-CN" altLang="en-US" dirty="0"/>
           </a:p>
           <a:p>
             <a:r>
               <a:rPr lang="zh-CN" altLang="en-US" dirty="0"/>
               <a:t>           刘洋       515030910486</a:t>
             </a:r>
-            <a:endParaRPr lang="zh-CN" altLang="en-US" dirty="0"/>
           </a:p>
           <a:p>
             <a:r>
               <a:rPr lang="zh-CN" altLang="en-US" dirty="0"/>
               <a:t>           吴烨        515030910512</a:t>
             </a:r>
-            <a:endParaRPr lang="zh-CN" altLang="en-US" dirty="0"/>
           </a:p>
           <a:p>
             <a:r>
               <a:rPr lang="zh-CN" altLang="en-US" dirty="0"/>
               <a:t> </a:t>
             </a:r>
-            <a:endParaRPr lang="zh-CN" altLang="en-US" dirty="0"/>
           </a:p>
           <a:p>
             <a:endParaRPr lang="zh-CN" altLang="en-US" dirty="0"/>
@@ -3622,7 +3604,7 @@
       </p:sp>
     </p:spTree>
     <p:custDataLst>
-      <p:tags r:id="rId3"/>
+      <p:tags r:id="rId1"/>
     </p:custDataLst>
   </p:cSld>
   <p:clrMapOvr>
@@ -3640,7 +3622,14 @@
         <p:cNvGrpSpPr/>
         <p:nvPr/>
       </p:nvGrpSpPr>
-      <p:grpSpPr/>
+      <p:grpSpPr>
+        <a:xfrm>
+          <a:off x="0" y="0"/>
+          <a:ext cx="0" cy="0"/>
+          <a:chOff x="0" y="0"/>
+          <a:chExt cx="0" cy="0"/>
+        </a:xfrm>
+      </p:grpSpPr>
       <p:sp>
         <p:nvSpPr>
           <p:cNvPr id="2" name="标题 1"/>
@@ -3654,6 +3643,7 @@
         <p:spPr/>
         <p:txBody>
           <a:bodyPr/>
+          <a:lstStyle/>
           <a:p>
             <a:r>
               <a:rPr lang="en-US" altLang="zh-CN"/>
@@ -3663,7 +3653,6 @@
               <a:rPr lang="zh-CN" altLang="en-US"/>
               <a:t>测试数据</a:t>
             </a:r>
-            <a:endParaRPr lang="zh-CN" altLang="en-US"/>
           </a:p>
         </p:txBody>
       </p:sp>
@@ -3682,6 +3671,7 @@
           <a:bodyPr>
             <a:normAutofit/>
           </a:bodyPr>
+          <a:lstStyle/>
           <a:p>
             <a:pPr marL="0" indent="0">
               <a:buNone/>
@@ -3696,7 +3686,6 @@
               <a:rPr lang="zh-CN" altLang="en-US"/>
               <a:t>基础数据部分：</a:t>
             </a:r>
-            <a:endParaRPr lang="zh-CN" altLang="en-US"/>
           </a:p>
           <a:p>
             <a:pPr marL="0" indent="0">
@@ -3722,7 +3711,6 @@
               <a:rPr lang="en-US" altLang="zh-CN"/>
               <a:t>  </a:t>
             </a:r>
-            <a:endParaRPr lang="en-US" altLang="zh-CN"/>
           </a:p>
           <a:p>
             <a:pPr marL="0" indent="0">
@@ -3748,7 +3736,6 @@
               <a:rPr lang="en-US" altLang="zh-CN"/>
               <a:t>  </a:t>
             </a:r>
-            <a:endParaRPr lang="en-US" altLang="zh-CN"/>
           </a:p>
           <a:p>
             <a:pPr marL="0" indent="0">
@@ -3770,7 +3757,6 @@
               <a:rPr lang="zh-CN" altLang="en-US"/>
               <a:t>条</a:t>
             </a:r>
-            <a:endParaRPr lang="zh-CN" altLang="en-US"/>
           </a:p>
           <a:p>
             <a:pPr marL="0" indent="0">
@@ -3802,7 +3788,6 @@
               <a:rPr lang="zh-CN" altLang="en-US"/>
               <a:t>导入数据库</a:t>
             </a:r>
-            <a:endParaRPr lang="zh-CN" altLang="en-US"/>
           </a:p>
           <a:p>
             <a:pPr marL="0" indent="0">
@@ -3832,7 +3817,14 @@
         <p:cNvGrpSpPr/>
         <p:nvPr/>
       </p:nvGrpSpPr>
-      <p:grpSpPr/>
+      <p:grpSpPr>
+        <a:xfrm>
+          <a:off x="0" y="0"/>
+          <a:ext cx="0" cy="0"/>
+          <a:chOff x="0" y="0"/>
+          <a:chExt cx="0" cy="0"/>
+        </a:xfrm>
+      </p:grpSpPr>
       <p:sp>
         <p:nvSpPr>
           <p:cNvPr id="2" name="标题 1"/>
@@ -3846,6 +3838,7 @@
         <p:spPr/>
         <p:txBody>
           <a:bodyPr/>
+          <a:lstStyle/>
           <a:p>
             <a:r>
               <a:rPr lang="en-US" altLang="zh-CN"/>
@@ -3855,7 +3848,6 @@
               <a:rPr lang="zh-CN" altLang="en-US"/>
               <a:t>测试数据</a:t>
             </a:r>
-            <a:endParaRPr lang="zh-CN" altLang="en-US"/>
           </a:p>
         </p:txBody>
       </p:sp>
@@ -3874,223 +3866,245 @@
           <a:bodyPr>
             <a:normAutofit/>
           </a:bodyPr>
+          <a:lstStyle/>
           <a:p>
             <a:pPr marL="0" indent="0">
               <a:buNone/>
             </a:pPr>
-            <a:endParaRPr lang="zh-CN" altLang="en-US"/>
+            <a:endParaRPr lang="zh-CN" altLang="en-US" dirty="0"/>
           </a:p>
           <a:p>
             <a:pPr marL="0" indent="0">
               <a:buNone/>
             </a:pPr>
             <a:r>
-              <a:rPr lang="zh-CN" altLang="en-US"/>
+              <a:rPr lang="zh-CN" altLang="en-US" dirty="0"/>
               <a:t>测试性能的数据部分</a:t>
             </a:r>
             <a:r>
-              <a:rPr lang="en-US" altLang="zh-CN"/>
+              <a:rPr lang="en-US" altLang="zh-CN" dirty="0"/>
               <a:t>: </a:t>
             </a:r>
-            <a:endParaRPr lang="en-US" altLang="zh-CN"/>
           </a:p>
           <a:p>
             <a:pPr marL="0" indent="0">
               <a:buNone/>
             </a:pPr>
             <a:r>
-              <a:rPr lang="en-US" altLang="zh-CN"/>
-              <a:t>	createADaySlot</a:t>
-            </a:r>
-            <a:r>
-              <a:rPr lang="zh-CN" altLang="en-US"/>
+              <a:rPr lang="en-US" altLang="zh-CN" dirty="0"/>
+              <a:t>	</a:t>
+            </a:r>
+            <a:r>
+              <a:rPr lang="en-US" altLang="zh-CN" dirty="0" err="1"/>
+              <a:t>createADaySlot</a:t>
+            </a:r>
+            <a:r>
+              <a:rPr lang="zh-CN" altLang="en-US" dirty="0"/>
               <a:t>：</a:t>
             </a:r>
             <a:r>
-              <a:rPr lang="en-US" altLang="zh-CN"/>
+              <a:rPr lang="en-US" altLang="zh-CN" dirty="0"/>
               <a:t> 	</a:t>
             </a:r>
             <a:r>
-              <a:rPr lang="zh-CN" altLang="en-US"/>
+              <a:rPr lang="zh-CN" altLang="en-US" dirty="0"/>
               <a:t>生成</a:t>
             </a:r>
             <a:r>
-              <a:rPr lang="en-US" altLang="zh-CN"/>
+              <a:rPr lang="en-US" altLang="zh-CN" dirty="0"/>
               <a:t>365</a:t>
             </a:r>
             <a:r>
-              <a:rPr lang="zh-CN" altLang="en-US"/>
+              <a:rPr lang="zh-CN" altLang="en-US" dirty="0"/>
               <a:t>天的</a:t>
             </a:r>
             <a:r>
-              <a:rPr lang="en-US" altLang="zh-CN"/>
-              <a:t>slot 	2‘07		</a:t>
-            </a:r>
-            <a:endParaRPr lang="en-US" altLang="zh-CN"/>
+              <a:rPr lang="en-US" altLang="zh-CN" dirty="0"/>
+              <a:t>slot 	</a:t>
+            </a:r>
+            <a:r>
+              <a:rPr lang="en-US" altLang="zh-CN" dirty="0" smtClean="0"/>
+              <a:t>0</a:t>
+            </a:r>
+            <a:r>
+              <a:rPr lang="en-US" altLang="zh-CN" dirty="0" smtClean="0"/>
+              <a:t>‘59	</a:t>
+            </a:r>
           </a:p>
           <a:p>
             <a:pPr marL="0" indent="0">
               <a:buNone/>
             </a:pPr>
             <a:r>
-              <a:rPr lang="en-US" altLang="zh-CN"/>
-              <a:t>	createOrder</a:t>
-            </a:r>
-            <a:r>
-              <a:rPr lang="zh-CN" altLang="en-US"/>
+              <a:rPr lang="en-US" altLang="zh-CN" dirty="0"/>
+              <a:t>	</a:t>
+            </a:r>
+            <a:r>
+              <a:rPr lang="en-US" altLang="zh-CN" dirty="0" err="1"/>
+              <a:t>createOrder</a:t>
+            </a:r>
+            <a:r>
+              <a:rPr lang="zh-CN" altLang="en-US" dirty="0"/>
               <a:t>：</a:t>
             </a:r>
             <a:r>
-              <a:rPr lang="en-US" altLang="zh-CN"/>
+              <a:rPr lang="en-US" altLang="zh-CN" dirty="0"/>
               <a:t> 	</a:t>
             </a:r>
             <a:r>
-              <a:rPr lang="zh-CN" altLang="en-US"/>
+              <a:rPr lang="zh-CN" altLang="en-US" dirty="0"/>
               <a:t>连续</a:t>
             </a:r>
             <a:r>
-              <a:rPr lang="en-US" altLang="zh-CN"/>
+              <a:rPr lang="en-US" altLang="zh-CN" dirty="0"/>
               <a:t>4 Slot</a:t>
             </a:r>
             <a:r>
-              <a:rPr lang="zh-CN" altLang="en-US"/>
+              <a:rPr lang="zh-CN" altLang="en-US" dirty="0"/>
               <a:t>（</a:t>
             </a:r>
             <a:r>
-              <a:rPr lang="en-US" altLang="zh-CN"/>
+              <a:rPr lang="en-US" altLang="zh-CN" dirty="0"/>
               <a:t>2</a:t>
             </a:r>
             <a:r>
-              <a:rPr lang="zh-CN" altLang="en-US"/>
+              <a:rPr lang="zh-CN" altLang="en-US" dirty="0"/>
               <a:t>小时）</a:t>
             </a:r>
             <a:r>
-              <a:rPr lang="en-US" altLang="zh-CN"/>
+              <a:rPr lang="en-US" altLang="zh-CN" dirty="0"/>
               <a:t>		      </a:t>
             </a:r>
-            <a:endParaRPr lang="en-US" altLang="zh-CN"/>
           </a:p>
           <a:p>
             <a:pPr marL="0" indent="0">
               <a:buNone/>
             </a:pPr>
             <a:r>
-              <a:rPr lang="en-US" altLang="zh-CN"/>
-              <a:t>				applicantId</a:t>
-            </a:r>
-            <a:r>
-              <a:rPr lang="zh-CN" altLang="en-US"/>
+              <a:rPr lang="en-US" altLang="zh-CN" dirty="0"/>
+              <a:t>				</a:t>
+            </a:r>
+            <a:r>
+              <a:rPr lang="en-US" altLang="zh-CN" dirty="0" err="1"/>
+              <a:t>applicantId</a:t>
+            </a:r>
+            <a:r>
+              <a:rPr lang="zh-CN" altLang="en-US" dirty="0"/>
               <a:t> 和 </a:t>
             </a:r>
             <a:r>
-              <a:rPr lang="en-US" altLang="zh-CN"/>
-              <a:t>beMember </a:t>
-            </a:r>
-            <a:r>
-              <a:rPr lang="zh-CN" altLang="en-US"/>
+              <a:rPr lang="en-US" altLang="zh-CN" dirty="0" err="1"/>
+              <a:t>beMember</a:t>
+            </a:r>
+            <a:r>
+              <a:rPr lang="en-US" altLang="zh-CN" dirty="0"/>
+              <a:t> </a:t>
+            </a:r>
+            <a:r>
+              <a:rPr lang="zh-CN" altLang="en-US" dirty="0"/>
               <a:t>随机指定</a:t>
             </a:r>
             <a:r>
-              <a:rPr lang="en-US" altLang="zh-CN"/>
+              <a:rPr lang="en-US" altLang="zh-CN" dirty="0"/>
               <a:t>5</a:t>
             </a:r>
             <a:r>
-              <a:rPr lang="zh-CN" altLang="en-US"/>
+              <a:rPr lang="zh-CN" altLang="en-US" dirty="0"/>
               <a:t>个</a:t>
             </a:r>
             <a:r>
-              <a:rPr lang="en-US" altLang="zh-CN"/>
+              <a:rPr lang="en-US" altLang="zh-CN" dirty="0"/>
               <a:t>user </a:t>
             </a:r>
-            <a:endParaRPr lang="en-US" altLang="zh-CN"/>
           </a:p>
           <a:p>
             <a:pPr marL="0" indent="0">
               <a:buNone/>
             </a:pPr>
             <a:r>
-              <a:rPr lang="en-US" altLang="zh-CN"/>
+              <a:rPr lang="en-US" altLang="zh-CN" dirty="0"/>
               <a:t>				</a:t>
             </a:r>
             <a:r>
-              <a:rPr lang="zh-CN" altLang="en-US"/>
+              <a:rPr lang="zh-CN" altLang="en-US" dirty="0"/>
               <a:t>随机通过 </a:t>
             </a:r>
             <a:r>
-              <a:rPr lang="en-US" altLang="zh-CN"/>
+              <a:rPr lang="en-US" altLang="zh-CN" dirty="0"/>
               <a:t>/ </a:t>
             </a:r>
             <a:r>
-              <a:rPr lang="zh-CN" altLang="en-US"/>
+              <a:rPr lang="zh-CN" altLang="en-US" dirty="0"/>
               <a:t>不通过（ 密码 </a:t>
             </a:r>
             <a:r>
-              <a:rPr lang="en-US" altLang="zh-CN"/>
+              <a:rPr lang="en-US" altLang="zh-CN" dirty="0"/>
               <a:t>1 / 0 </a:t>
             </a:r>
             <a:r>
-              <a:rPr lang="zh-CN" altLang="en-US"/>
+              <a:rPr lang="zh-CN" altLang="en-US" dirty="0"/>
               <a:t>）</a:t>
             </a:r>
             <a:r>
-              <a:rPr lang="en-US" altLang="zh-CN"/>
+              <a:rPr lang="en-US" altLang="zh-CN" dirty="0"/>
               <a:t> </a:t>
             </a:r>
-            <a:endParaRPr lang="en-US" altLang="zh-CN"/>
           </a:p>
           <a:p>
             <a:pPr marL="0" indent="0">
               <a:buNone/>
             </a:pPr>
             <a:r>
-              <a:rPr lang="en-US" altLang="zh-CN"/>
+              <a:rPr lang="en-US" altLang="zh-CN" dirty="0"/>
               <a:t>				</a:t>
             </a:r>
             <a:r>
-              <a:rPr lang="zh-CN" altLang="en-US"/>
+              <a:rPr lang="zh-CN" altLang="en-US" dirty="0"/>
               <a:t>改进前： 单个</a:t>
             </a:r>
             <a:r>
-              <a:rPr lang="en-US" altLang="zh-CN"/>
+              <a:rPr lang="en-US" altLang="zh-CN" dirty="0"/>
               <a:t>order </a:t>
             </a:r>
             <a:r>
-              <a:rPr lang="zh-CN" altLang="en-US"/>
+              <a:rPr lang="zh-CN" altLang="en-US" dirty="0"/>
               <a:t>每个</a:t>
             </a:r>
             <a:r>
-              <a:rPr lang="en-US" altLang="zh-CN"/>
+              <a:rPr lang="en-US" altLang="zh-CN" dirty="0"/>
               <a:t>+1s</a:t>
             </a:r>
-            <a:endParaRPr lang="en-US" altLang="zh-CN"/>
           </a:p>
           <a:p>
             <a:pPr marL="0" indent="0">
               <a:buNone/>
             </a:pPr>
-            <a:endParaRPr lang="zh-CN" altLang="en-US"/>
+            <a:endParaRPr lang="zh-CN" altLang="en-US" dirty="0"/>
           </a:p>
           <a:p>
             <a:pPr marL="0" indent="0">
               <a:buNone/>
             </a:pPr>
             <a:r>
-              <a:rPr lang="zh-CN" altLang="en-US"/>
+              <a:rPr lang="zh-CN" altLang="en-US" dirty="0"/>
               <a:t>方式：</a:t>
             </a:r>
             <a:r>
-              <a:rPr lang="en-US" altLang="zh-CN"/>
+              <a:rPr lang="en-US" altLang="zh-CN" dirty="0"/>
               <a:t>python</a:t>
             </a:r>
             <a:r>
-              <a:rPr lang="zh-CN" altLang="en-US"/>
+              <a:rPr lang="zh-CN" altLang="en-US" dirty="0"/>
               <a:t>生成</a:t>
             </a:r>
             <a:r>
-              <a:rPr lang="en-US" altLang="zh-CN"/>
-              <a:t>sql </a:t>
-            </a:r>
-            <a:endParaRPr lang="en-US" altLang="zh-CN"/>
+              <a:rPr lang="en-US" altLang="zh-CN" dirty="0" err="1"/>
+              <a:t>sql</a:t>
+            </a:r>
+            <a:r>
+              <a:rPr lang="en-US" altLang="zh-CN" dirty="0"/>
+              <a:t> </a:t>
+            </a:r>
           </a:p>
         </p:txBody>
       </p:sp>
@@ -4114,7 +4128,14 @@
         <p:cNvGrpSpPr/>
         <p:nvPr/>
       </p:nvGrpSpPr>
-      <p:grpSpPr/>
+      <p:grpSpPr>
+        <a:xfrm>
+          <a:off x="0" y="0"/>
+          <a:ext cx="0" cy="0"/>
+          <a:chOff x="0" y="0"/>
+          <a:chExt cx="0" cy="0"/>
+        </a:xfrm>
+      </p:grpSpPr>
       <p:sp>
         <p:nvSpPr>
           <p:cNvPr id="2" name="标题 1"/>
@@ -4128,6 +4149,7 @@
         <p:spPr/>
         <p:txBody>
           <a:bodyPr/>
+          <a:lstStyle/>
           <a:p>
             <a:r>
               <a:rPr lang="en-US" altLang="zh-CN"/>
@@ -4137,7 +4159,6 @@
               <a:rPr lang="zh-CN" altLang="en-US"/>
               <a:t>查询方案及代价</a:t>
             </a:r>
-            <a:endParaRPr lang="zh-CN" altLang="en-US"/>
           </a:p>
         </p:txBody>
       </p:sp>
@@ -4154,93 +4175,207 @@
         <p:spPr/>
         <p:txBody>
           <a:bodyPr/>
+          <a:lstStyle/>
           <a:p>
             <a:pPr marL="0" indent="0">
               <a:buNone/>
             </a:pPr>
-            <a:endParaRPr lang="zh-CN" altLang="en-US"/>
+            <a:endParaRPr lang="zh-CN" altLang="en-US" dirty="0"/>
           </a:p>
           <a:p>
             <a:pPr marL="0" indent="0">
               <a:buNone/>
             </a:pPr>
             <a:r>
-              <a:rPr lang="zh-CN" altLang="en-US"/>
+              <a:rPr lang="zh-CN" altLang="en-US" dirty="0"/>
               <a:t>查询：</a:t>
             </a:r>
-            <a:endParaRPr lang="zh-CN" altLang="en-US"/>
           </a:p>
           <a:p>
             <a:pPr marL="0" indent="0">
               <a:buNone/>
             </a:pPr>
             <a:r>
-              <a:rPr lang="en-US" altLang="zh-CN">
+              <a:rPr lang="en-US" altLang="zh-CN" dirty="0" err="1">
                 <a:sym typeface="+mn-ea"/>
               </a:rPr>
-              <a:t>searchSlot:	</a:t>
-            </a:r>
-            <a:r>
-              <a:rPr lang="zh-CN" altLang="en-US">
+              <a:t>searchSlot</a:t>
+            </a:r>
+            <a:r>
+              <a:rPr lang="en-US" altLang="zh-CN" dirty="0">
                 <a:sym typeface="+mn-ea"/>
               </a:rPr>
-              <a:t>在一天中找</a:t>
-            </a:r>
-            <a:r>
-              <a:rPr lang="en-US" altLang="zh-CN">
+              <a:t>:	</a:t>
+            </a:r>
+            <a:r>
+              <a:rPr lang="zh-CN" altLang="en-US" dirty="0" smtClean="0">
+                <a:sym typeface="+mn-ea"/>
+              </a:rPr>
+              <a:t>指定一间图书馆、</a:t>
+            </a:r>
+            <a:r>
+              <a:rPr lang="zh-CN" altLang="en-US" dirty="0" smtClean="0">
+                <a:sym typeface="+mn-ea"/>
+              </a:rPr>
+              <a:t>在</a:t>
+            </a:r>
+            <a:r>
+              <a:rPr lang="zh-CN" altLang="en-US" dirty="0">
+                <a:sym typeface="+mn-ea"/>
+              </a:rPr>
+              <a:t>一天中找</a:t>
+            </a:r>
+            <a:r>
+              <a:rPr lang="en-US" altLang="zh-CN" dirty="0">
                 <a:sym typeface="+mn-ea"/>
               </a:rPr>
               <a:t>Slot  </a:t>
             </a:r>
-            <a:endParaRPr lang="en-US" altLang="zh-CN"/>
+            <a:endParaRPr lang="en-US" altLang="zh-CN" dirty="0"/>
           </a:p>
           <a:p>
             <a:pPr marL="0" indent="0">
               <a:buNone/>
             </a:pPr>
             <a:r>
-              <a:rPr lang="en-US" altLang="zh-CN">
+              <a:rPr lang="en-US" altLang="zh-CN" dirty="0">
                 <a:sym typeface="+mn-ea"/>
               </a:rPr>
               <a:t>		</a:t>
             </a:r>
             <a:r>
-              <a:rPr lang="zh-CN" altLang="en-US">
+              <a:rPr lang="zh-CN" altLang="en-US" dirty="0">
                 <a:sym typeface="+mn-ea"/>
               </a:rPr>
               <a:t>优化前： </a:t>
             </a:r>
             <a:r>
-              <a:rPr lang="en-US" altLang="zh-CN">
+              <a:rPr lang="en-US" altLang="zh-CN" dirty="0">
                 <a:sym typeface="+mn-ea"/>
               </a:rPr>
               <a:t>5.3s	concurrency</a:t>
             </a:r>
             <a:r>
-              <a:rPr lang="zh-CN" altLang="en-US">
+              <a:rPr lang="zh-CN" altLang="en-US" dirty="0">
                 <a:sym typeface="+mn-ea"/>
               </a:rPr>
               <a:t>： </a:t>
             </a:r>
             <a:r>
-              <a:rPr lang="en-US" altLang="zh-CN">
+              <a:rPr lang="en-US" altLang="zh-CN" dirty="0" smtClean="0">
                 <a:sym typeface="+mn-ea"/>
               </a:rPr>
               <a:t>50</a:t>
             </a:r>
-            <a:endParaRPr lang="en-US" altLang="zh-CN"/>
           </a:p>
           <a:p>
             <a:pPr marL="0" indent="0">
               <a:buNone/>
             </a:pPr>
-            <a:endParaRPr lang="zh-CN" altLang="en-US"/>
+            <a:r>
+              <a:rPr lang="en-US" altLang="zh-CN" dirty="0">
+                <a:sym typeface="+mn-ea"/>
+              </a:rPr>
+              <a:t>	</a:t>
+            </a:r>
+            <a:r>
+              <a:rPr lang="en-US" altLang="zh-CN" dirty="0" smtClean="0">
+                <a:sym typeface="+mn-ea"/>
+              </a:rPr>
+              <a:t>	</a:t>
+            </a:r>
+            <a:r>
+              <a:rPr lang="zh-CN" altLang="en-US" dirty="0" smtClean="0">
+                <a:sym typeface="+mn-ea"/>
+              </a:rPr>
+              <a:t>优化后： </a:t>
+            </a:r>
+            <a:r>
+              <a:rPr lang="en-US" altLang="zh-CN" dirty="0" smtClean="0">
+                <a:sym typeface="+mn-ea"/>
+              </a:rPr>
+              <a:t>0.262s</a:t>
+            </a:r>
+            <a:r>
+              <a:rPr lang="en-US" altLang="zh-CN" dirty="0">
+                <a:sym typeface="+mn-ea"/>
+              </a:rPr>
+              <a:t>	concurrency</a:t>
+            </a:r>
+            <a:r>
+              <a:rPr lang="zh-CN" altLang="en-US" dirty="0">
+                <a:sym typeface="+mn-ea"/>
+              </a:rPr>
+              <a:t>： </a:t>
+            </a:r>
+            <a:r>
+              <a:rPr lang="en-US" altLang="zh-CN" dirty="0" smtClean="0">
+                <a:sym typeface="+mn-ea"/>
+              </a:rPr>
+              <a:t>50</a:t>
+            </a:r>
           </a:p>
           <a:p>
             <a:pPr marL="0" indent="0">
               <a:buNone/>
             </a:pPr>
-            <a:endParaRPr lang="zh-CN" altLang="en-US"/>
+            <a:r>
+              <a:rPr lang="en-US" altLang="zh-CN" dirty="0">
+                <a:sym typeface="+mn-ea"/>
+              </a:rPr>
+              <a:t>	</a:t>
+            </a:r>
+            <a:r>
+              <a:rPr lang="en-US" altLang="zh-CN" dirty="0" smtClean="0">
+                <a:sym typeface="+mn-ea"/>
+              </a:rPr>
+              <a:t>	(</a:t>
+            </a:r>
+            <a:r>
+              <a:rPr lang="zh-CN" altLang="en-US" dirty="0" smtClean="0">
+                <a:sym typeface="+mn-ea"/>
+              </a:rPr>
+              <a:t>通过加</a:t>
+            </a:r>
+            <a:r>
+              <a:rPr lang="en-US" altLang="zh-CN" dirty="0" smtClean="0">
+                <a:sym typeface="+mn-ea"/>
+              </a:rPr>
+              <a:t>date</a:t>
+            </a:r>
+            <a:r>
+              <a:rPr lang="zh-CN" altLang="en-US" dirty="0" smtClean="0">
+                <a:sym typeface="+mn-ea"/>
+              </a:rPr>
+              <a:t>的索引</a:t>
+            </a:r>
+            <a:r>
+              <a:rPr lang="en-US" altLang="zh-CN" dirty="0" smtClean="0">
+                <a:sym typeface="+mn-ea"/>
+              </a:rPr>
+              <a:t>)</a:t>
+            </a:r>
+            <a:endParaRPr lang="en-US" altLang="zh-CN" dirty="0">
+              <a:sym typeface="+mn-ea"/>
+            </a:endParaRPr>
+          </a:p>
+          <a:p>
+            <a:pPr marL="0" indent="0">
+              <a:buNone/>
+            </a:pPr>
+            <a:endParaRPr lang="en-US" altLang="zh-CN" dirty="0"/>
+          </a:p>
+          <a:p>
+            <a:pPr marL="0" indent="0">
+              <a:buNone/>
+            </a:pPr>
+            <a:endParaRPr lang="zh-CN" altLang="en-US" dirty="0"/>
+          </a:p>
+          <a:p>
+            <a:pPr marL="0" indent="0">
+              <a:buNone/>
+            </a:pPr>
+            <a:endParaRPr lang="zh-CN" altLang="en-US" dirty="0"/>
           </a:p>
         </p:txBody>
       </p:sp>
@@ -4264,7 +4399,14 @@
         <p:cNvGrpSpPr/>
         <p:nvPr/>
       </p:nvGrpSpPr>
-      <p:grpSpPr/>
+      <p:grpSpPr>
+        <a:xfrm>
+          <a:off x="0" y="0"/>
+          <a:ext cx="0" cy="0"/>
+          <a:chOff x="0" y="0"/>
+          <a:chExt cx="0" cy="0"/>
+        </a:xfrm>
+      </p:grpSpPr>
       <p:sp>
         <p:nvSpPr>
           <p:cNvPr id="2" name="标题 1"/>
@@ -4278,6 +4420,7 @@
         <p:spPr/>
         <p:txBody>
           <a:bodyPr/>
+          <a:lstStyle/>
           <a:p>
             <a:r>
               <a:rPr lang="en-US" altLang="zh-CN"/>
@@ -4287,7 +4430,6 @@
               <a:rPr lang="zh-CN" altLang="en-US"/>
               <a:t>优化 </a:t>
             </a:r>
-            <a:endParaRPr lang="zh-CN" altLang="en-US"/>
           </a:p>
         </p:txBody>
       </p:sp>
@@ -4304,6 +4446,7 @@
         <p:spPr/>
         <p:txBody>
           <a:bodyPr/>
+          <a:lstStyle/>
           <a:p>
             <a:pPr marL="0" indent="0">
               <a:buNone/>
@@ -4322,7 +4465,6 @@
               <a:rPr lang="zh-CN" altLang="en-US"/>
               <a:t>：</a:t>
             </a:r>
-            <a:endParaRPr lang="zh-CN" altLang="en-US"/>
           </a:p>
           <a:p>
             <a:pPr marL="0" indent="0">
@@ -4344,7 +4486,6 @@
               <a:rPr lang="zh-CN" altLang="en-US"/>
               <a:t>替换</a:t>
             </a:r>
-            <a:endParaRPr lang="zh-CN" altLang="en-US"/>
           </a:p>
           <a:p>
             <a:pPr marL="0" indent="0">
@@ -4358,7 +4499,6 @@
               <a:rPr lang="zh-CN" altLang="en-US"/>
               <a:t>去除</a:t>
             </a:r>
-            <a:endParaRPr lang="zh-CN" altLang="en-US"/>
           </a:p>
         </p:txBody>
       </p:sp>
@@ -4418,7 +4558,6 @@
               <a:rPr lang="zh-CN" altLang="en-US" sz="5400"/>
               <a:t>演示</a:t>
             </a:r>
-            <a:endParaRPr lang="zh-CN" altLang="en-US" sz="5400"/>
           </a:p>
         </p:txBody>
       </p:sp>
@@ -4434,15 +4573,15 @@
 </file>
 
 <file path=ppt/tags/tag1.xml><?xml version="1.0" encoding="utf-8"?>
-<p:tagLst xmlns:p="http://schemas.openxmlformats.org/presentationml/2006/main">
-  <p:tag name="MH" val="20150921105644"/>
-  <p:tag name="MH_LIBRARY" val="GRAPHIC"/>
-  <p:tag name="MH_ORDER" val="直接连接符 3"/>
+<p:tagLst xmlns:a="http://schemas.openxmlformats.org/drawingml/2006/main" xmlns:r="http://schemas.openxmlformats.org/officeDocument/2006/relationships" xmlns:p="http://schemas.openxmlformats.org/presentationml/2006/main">
+  <p:tag name="KSO_WM_TAG_VERSION" val="1.0"/>
+  <p:tag name="KSO_WM_TEMPLATE_CATEGORY" val="custom"/>
+  <p:tag name="KSO_WM_TEMPLATE_INDEX" val="160539"/>
 </p:tagLst>
 </file>
 
 <file path=ppt/tags/tag10.xml><?xml version="1.0" encoding="utf-8"?>
-<p:tagLst xmlns:p="http://schemas.openxmlformats.org/presentationml/2006/main">
+<p:tagLst xmlns:a="http://schemas.openxmlformats.org/drawingml/2006/main" xmlns:r="http://schemas.openxmlformats.org/officeDocument/2006/relationships" xmlns:p="http://schemas.openxmlformats.org/presentationml/2006/main">
   <p:tag name="KSO_WM_BEAUTIFY_FLAG" val="#wm#"/>
   <p:tag name="KSO_WM_TEMPLATE_CATEGORY" val="custom"/>
   <p:tag name="KSO_WM_TEMPLATE_INDEX" val="160539"/>
@@ -4450,7 +4589,7 @@
 </file>
 
 <file path=ppt/tags/tag11.xml><?xml version="1.0" encoding="utf-8"?>
-<p:tagLst xmlns:p="http://schemas.openxmlformats.org/presentationml/2006/main">
+<p:tagLst xmlns:a="http://schemas.openxmlformats.org/drawingml/2006/main" xmlns:r="http://schemas.openxmlformats.org/officeDocument/2006/relationships" xmlns:p="http://schemas.openxmlformats.org/presentationml/2006/main">
   <p:tag name="KSO_WM_BEAUTIFY_FLAG" val="#wm#"/>
   <p:tag name="KSO_WM_TEMPLATE_CATEGORY" val="custom"/>
   <p:tag name="KSO_WM_TEMPLATE_INDEX" val="160539"/>
@@ -4458,7 +4597,7 @@
 </file>
 
 <file path=ppt/tags/tag12.xml><?xml version="1.0" encoding="utf-8"?>
-<p:tagLst xmlns:p="http://schemas.openxmlformats.org/presentationml/2006/main">
+<p:tagLst xmlns:a="http://schemas.openxmlformats.org/drawingml/2006/main" xmlns:r="http://schemas.openxmlformats.org/officeDocument/2006/relationships" xmlns:p="http://schemas.openxmlformats.org/presentationml/2006/main">
   <p:tag name="KSO_WM_BEAUTIFY_FLAG" val="#wm#"/>
   <p:tag name="KSO_WM_TEMPLATE_CATEGORY" val="custom"/>
   <p:tag name="KSO_WM_TEMPLATE_INDEX" val="160539"/>
@@ -4466,31 +4605,47 @@
 </file>
 
 <file path=ppt/tags/tag2.xml><?xml version="1.0" encoding="utf-8"?>
-<p:tagLst xmlns:p="http://schemas.openxmlformats.org/presentationml/2006/main">
+<p:tagLst xmlns:a="http://schemas.openxmlformats.org/drawingml/2006/main" xmlns:r="http://schemas.openxmlformats.org/officeDocument/2006/relationships" xmlns:p="http://schemas.openxmlformats.org/presentationml/2006/main">
+  <p:tag name="KSO_WM_TAG_VERSION" val="1.0"/>
+  <p:tag name="KSO_WM_TEMPLATE_CATEGORY" val="custom"/>
+  <p:tag name="KSO_WM_TEMPLATE_INDEX" val="160539"/>
+</p:tagLst>
+</file>
+
+<file path=ppt/tags/tag3.xml><?xml version="1.0" encoding="utf-8"?>
+<p:tagLst xmlns:a="http://schemas.openxmlformats.org/drawingml/2006/main" xmlns:r="http://schemas.openxmlformats.org/officeDocument/2006/relationships" xmlns:p="http://schemas.openxmlformats.org/presentationml/2006/main">
+  <p:tag name="MH" val="20150921105644"/>
+  <p:tag name="MH_LIBRARY" val="GRAPHIC"/>
+  <p:tag name="MH_ORDER" val="直接连接符 3"/>
+</p:tagLst>
+</file>
+
+<file path=ppt/tags/tag4.xml><?xml version="1.0" encoding="utf-8"?>
+<p:tagLst xmlns:a="http://schemas.openxmlformats.org/drawingml/2006/main" xmlns:r="http://schemas.openxmlformats.org/officeDocument/2006/relationships" xmlns:p="http://schemas.openxmlformats.org/presentationml/2006/main">
   <p:tag name="MH" val="20150921105644"/>
   <p:tag name="MH_LIBRARY" val="GRAPHIC"/>
   <p:tag name="MH_ORDER" val="直接连接符 4"/>
 </p:tagLst>
 </file>
 
-<file path=ppt/tags/tag3.xml><?xml version="1.0" encoding="utf-8"?>
-<p:tagLst xmlns:p="http://schemas.openxmlformats.org/presentationml/2006/main">
-  <p:tag name="KSO_WM_TAG_VERSION" val="1.0"/>
+<file path=ppt/tags/tag5.xml><?xml version="1.0" encoding="utf-8"?>
+<p:tagLst xmlns:a="http://schemas.openxmlformats.org/drawingml/2006/main" xmlns:r="http://schemas.openxmlformats.org/officeDocument/2006/relationships" xmlns:p="http://schemas.openxmlformats.org/presentationml/2006/main">
+  <p:tag name="KSO_WM_TEMPLATE_THUMBS_INDEX" val="1、4、5、8、12、16、23、25、27"/>
   <p:tag name="KSO_WM_TEMPLATE_CATEGORY" val="custom"/>
   <p:tag name="KSO_WM_TEMPLATE_INDEX" val="160539"/>
+  <p:tag name="KSO_WM_TAG_VERSION" val="1.0"/>
+  <p:tag name="KSO_WM_SLIDE_ID" val="custom160539_1"/>
+  <p:tag name="KSO_WM_SLIDE_INDEX" val="1"/>
+  <p:tag name="KSO_WM_SLIDE_ITEM_CNT" val="2"/>
+  <p:tag name="KSO_WM_SLIDE_LAYOUT" val="a_b"/>
+  <p:tag name="KSO_WM_SLIDE_LAYOUT_CNT" val="1_1"/>
+  <p:tag name="KSO_WM_SLIDE_TYPE" val="title"/>
+  <p:tag name="KSO_WM_BEAUTIFY_FLAG" val="#wm#"/>
 </p:tagLst>
 </file>
 
-<file path=ppt/tags/tag4.xml><?xml version="1.0" encoding="utf-8"?>
-<p:tagLst xmlns:p="http://schemas.openxmlformats.org/presentationml/2006/main">
-  <p:tag name="KSO_WM_TAG_VERSION" val="1.0"/>
-  <p:tag name="KSO_WM_TEMPLATE_CATEGORY" val="custom"/>
-  <p:tag name="KSO_WM_TEMPLATE_INDEX" val="160539"/>
-</p:tagLst>
-</file>
-
-<file path=ppt/tags/tag5.xml><?xml version="1.0" encoding="utf-8"?>
-<p:tagLst xmlns:p="http://schemas.openxmlformats.org/presentationml/2006/main">
+<file path=ppt/tags/tag6.xml><?xml version="1.0" encoding="utf-8"?>
+<p:tagLst xmlns:a="http://schemas.openxmlformats.org/drawingml/2006/main" xmlns:r="http://schemas.openxmlformats.org/officeDocument/2006/relationships" xmlns:p="http://schemas.openxmlformats.org/presentationml/2006/main">
   <p:tag name="KSO_WM_TAG_VERSION" val="1.0"/>
   <p:tag name="KSO_WM_BEAUTIFY_FLAG" val="#wm#"/>
   <p:tag name="KSO_WM_TEMPLATE_CATEGORY" val="custom"/>
@@ -4509,8 +4664,8 @@
 </p:tagLst>
 </file>
 
-<file path=ppt/tags/tag6.xml><?xml version="1.0" encoding="utf-8"?>
-<p:tagLst xmlns:p="http://schemas.openxmlformats.org/presentationml/2006/main">
+<file path=ppt/tags/tag7.xml><?xml version="1.0" encoding="utf-8"?>
+<p:tagLst xmlns:a="http://schemas.openxmlformats.org/drawingml/2006/main" xmlns:r="http://schemas.openxmlformats.org/officeDocument/2006/relationships" xmlns:p="http://schemas.openxmlformats.org/presentationml/2006/main">
   <p:tag name="KSO_WM_TAG_VERSION" val="1.0"/>
   <p:tag name="KSO_WM_BEAUTIFY_FLAG" val="#wm#"/>
   <p:tag name="KSO_WM_TEMPLATE_CATEGORY" val="custom"/>
@@ -4529,24 +4684,8 @@
 </p:tagLst>
 </file>
 
-<file path=ppt/tags/tag7.xml><?xml version="1.0" encoding="utf-8"?>
-<p:tagLst xmlns:p="http://schemas.openxmlformats.org/presentationml/2006/main">
-  <p:tag name="KSO_WM_TEMPLATE_THUMBS_INDEX" val="1、4、5、8、12、16、23、25、27"/>
-  <p:tag name="KSO_WM_TEMPLATE_CATEGORY" val="custom"/>
-  <p:tag name="KSO_WM_TEMPLATE_INDEX" val="160539"/>
-  <p:tag name="KSO_WM_TAG_VERSION" val="1.0"/>
-  <p:tag name="KSO_WM_SLIDE_ID" val="custom160539_1"/>
-  <p:tag name="KSO_WM_SLIDE_INDEX" val="1"/>
-  <p:tag name="KSO_WM_SLIDE_ITEM_CNT" val="2"/>
-  <p:tag name="KSO_WM_SLIDE_LAYOUT" val="a_b"/>
-  <p:tag name="KSO_WM_SLIDE_LAYOUT_CNT" val="1_1"/>
-  <p:tag name="KSO_WM_SLIDE_TYPE" val="title"/>
-  <p:tag name="KSO_WM_BEAUTIFY_FLAG" val="#wm#"/>
-</p:tagLst>
-</file>
-
 <file path=ppt/tags/tag8.xml><?xml version="1.0" encoding="utf-8"?>
-<p:tagLst xmlns:p="http://schemas.openxmlformats.org/presentationml/2006/main">
+<p:tagLst xmlns:a="http://schemas.openxmlformats.org/drawingml/2006/main" xmlns:r="http://schemas.openxmlformats.org/officeDocument/2006/relationships" xmlns:p="http://schemas.openxmlformats.org/presentationml/2006/main">
   <p:tag name="KSO_WM_BEAUTIFY_FLAG" val="#wm#"/>
   <p:tag name="KSO_WM_TEMPLATE_CATEGORY" val="custom"/>
   <p:tag name="KSO_WM_TEMPLATE_INDEX" val="160539"/>
@@ -4554,7 +4693,7 @@
 </file>
 
 <file path=ppt/tags/tag9.xml><?xml version="1.0" encoding="utf-8"?>
-<p:tagLst xmlns:p="http://schemas.openxmlformats.org/presentationml/2006/main">
+<p:tagLst xmlns:a="http://schemas.openxmlformats.org/drawingml/2006/main" xmlns:r="http://schemas.openxmlformats.org/officeDocument/2006/relationships" xmlns:p="http://schemas.openxmlformats.org/presentationml/2006/main">
   <p:tag name="KSO_WM_BEAUTIFY_FLAG" val="#wm#"/>
   <p:tag name="KSO_WM_TEMPLATE_CATEGORY" val="custom"/>
   <p:tag name="KSO_WM_TEMPLATE_INDEX" val="160539"/>

</xml_diff>